<commit_message>
shabik v3.6.4.0 fix Lunch4j settings
- Let Lunch4j to make the exe folder in the project folder.
- fix bugs of FORWARD_ONLY mode. now you can connect to SQLite or any
other DBMS of FORWARD_ONLY.
- postgreSQL is added and tested.
</commit_message>
<xml_diff>
--- a/data/Logo.pptx
+++ b/data/Logo.pptx
@@ -113,6 +113,10 @@
 </p:presentation>
 </file>
 
+<file path=ppt/revisionInfo.xml><?xml version="1.0" encoding="utf-8"?>
+<p1510:revInfo xmlns:a="http://schemas.openxmlformats.org/drawingml/2006/main" xmlns:r="http://schemas.openxmlformats.org/officeDocument/2006/relationships" xmlns:p1510="http://schemas.microsoft.com/office/powerpoint/2015/10/main"/>
+</file>
+
 <file path=ppt/slideLayouts/slideLayout1.xml><?xml version="1.0" encoding="utf-8"?>
 <p:sldLayout xmlns:a="http://schemas.openxmlformats.org/drawingml/2006/main" xmlns:r="http://schemas.openxmlformats.org/officeDocument/2006/relationships" xmlns:p="http://schemas.openxmlformats.org/presentationml/2006/main" type="title" preserve="1">
   <p:cSld name="Title Slide">
@@ -242,7 +246,7 @@
           <a:p>
             <a:fld id="{0EC33659-3A6A-4530-9102-242EEED9E641}" type="datetimeFigureOut">
               <a:rPr lang="en-US" smtClean="0"/>
-              <a:t>09-03-2017</a:t>
+              <a:t>25-11-2017</a:t>
             </a:fld>
             <a:endParaRPr lang="en-US"/>
           </a:p>
@@ -410,7 +414,7 @@
           <a:p>
             <a:fld id="{0EC33659-3A6A-4530-9102-242EEED9E641}" type="datetimeFigureOut">
               <a:rPr lang="en-US" smtClean="0"/>
-              <a:t>09-03-2017</a:t>
+              <a:t>25-11-2017</a:t>
             </a:fld>
             <a:endParaRPr lang="en-US"/>
           </a:p>
@@ -588,7 +592,7 @@
           <a:p>
             <a:fld id="{0EC33659-3A6A-4530-9102-242EEED9E641}" type="datetimeFigureOut">
               <a:rPr lang="en-US" smtClean="0"/>
-              <a:t>09-03-2017</a:t>
+              <a:t>25-11-2017</a:t>
             </a:fld>
             <a:endParaRPr lang="en-US"/>
           </a:p>
@@ -756,7 +760,7 @@
           <a:p>
             <a:fld id="{0EC33659-3A6A-4530-9102-242EEED9E641}" type="datetimeFigureOut">
               <a:rPr lang="en-US" smtClean="0"/>
-              <a:t>09-03-2017</a:t>
+              <a:t>25-11-2017</a:t>
             </a:fld>
             <a:endParaRPr lang="en-US"/>
           </a:p>
@@ -1001,7 +1005,7 @@
           <a:p>
             <a:fld id="{0EC33659-3A6A-4530-9102-242EEED9E641}" type="datetimeFigureOut">
               <a:rPr lang="en-US" smtClean="0"/>
-              <a:t>09-03-2017</a:t>
+              <a:t>25-11-2017</a:t>
             </a:fld>
             <a:endParaRPr lang="en-US"/>
           </a:p>
@@ -1230,7 +1234,7 @@
           <a:p>
             <a:fld id="{0EC33659-3A6A-4530-9102-242EEED9E641}" type="datetimeFigureOut">
               <a:rPr lang="en-US" smtClean="0"/>
-              <a:t>09-03-2017</a:t>
+              <a:t>25-11-2017</a:t>
             </a:fld>
             <a:endParaRPr lang="en-US"/>
           </a:p>
@@ -1594,7 +1598,7 @@
           <a:p>
             <a:fld id="{0EC33659-3A6A-4530-9102-242EEED9E641}" type="datetimeFigureOut">
               <a:rPr lang="en-US" smtClean="0"/>
-              <a:t>09-03-2017</a:t>
+              <a:t>25-11-2017</a:t>
             </a:fld>
             <a:endParaRPr lang="en-US"/>
           </a:p>
@@ -1711,7 +1715,7 @@
           <a:p>
             <a:fld id="{0EC33659-3A6A-4530-9102-242EEED9E641}" type="datetimeFigureOut">
               <a:rPr lang="en-US" smtClean="0"/>
-              <a:t>09-03-2017</a:t>
+              <a:t>25-11-2017</a:t>
             </a:fld>
             <a:endParaRPr lang="en-US"/>
           </a:p>
@@ -1806,7 +1810,7 @@
           <a:p>
             <a:fld id="{0EC33659-3A6A-4530-9102-242EEED9E641}" type="datetimeFigureOut">
               <a:rPr lang="en-US" smtClean="0"/>
-              <a:t>09-03-2017</a:t>
+              <a:t>25-11-2017</a:t>
             </a:fld>
             <a:endParaRPr lang="en-US"/>
           </a:p>
@@ -2081,7 +2085,7 @@
           <a:p>
             <a:fld id="{0EC33659-3A6A-4530-9102-242EEED9E641}" type="datetimeFigureOut">
               <a:rPr lang="en-US" smtClean="0"/>
-              <a:t>09-03-2017</a:t>
+              <a:t>25-11-2017</a:t>
             </a:fld>
             <a:endParaRPr lang="en-US"/>
           </a:p>
@@ -2333,7 +2337,7 @@
           <a:p>
             <a:fld id="{0EC33659-3A6A-4530-9102-242EEED9E641}" type="datetimeFigureOut">
               <a:rPr lang="en-US" smtClean="0"/>
-              <a:t>09-03-2017</a:t>
+              <a:t>25-11-2017</a:t>
             </a:fld>
             <a:endParaRPr lang="en-US"/>
           </a:p>
@@ -2544,7 +2548,7 @@
           <a:p>
             <a:fld id="{0EC33659-3A6A-4530-9102-242EEED9E641}" type="datetimeFigureOut">
               <a:rPr lang="en-US" smtClean="0"/>
-              <a:t>09-03-2017</a:t>
+              <a:t>25-11-2017</a:t>
             </a:fld>
             <a:endParaRPr lang="en-US"/>
           </a:p>
@@ -3089,7 +3093,7 @@
                   <a:latin typeface="Courier New" panose="02070309020205020404" pitchFamily="49" charset="0"/>
                   <a:cs typeface="Courier New" panose="02070309020205020404" pitchFamily="49" charset="0"/>
                 </a:rPr>
-                <a:t>Version: 3.5.0.1</a:t>
+                <a:t>Version: 3.6.4.0</a:t>
               </a:r>
             </a:p>
             <a:p>
@@ -3098,7 +3102,7 @@
                   <a:latin typeface="Courier New" panose="02070309020205020404" pitchFamily="49" charset="0"/>
                   <a:cs typeface="Courier New" panose="02070309020205020404" pitchFamily="49" charset="0"/>
                 </a:rPr>
-                <a:t>Release: 8 March 2017</a:t>
+                <a:t>Release: 25 November 2017</a:t>
               </a:r>
             </a:p>
             <a:p>

</xml_diff>